<commit_message>
Added updated example for Azure Blob Storage Containers
</commit_message>
<xml_diff>
--- a/Azure Blob Storage/Storage Queues/Azure Storage Queues.pptx
+++ b/Azure Blob Storage/Storage Queues/Azure Storage Queues.pptx
@@ -1249,7 +1249,7 @@
           <a:p>
             <a:fld id="{0C443C8C-1446-4BE2-8B22-EED4E0554042}" type="datetimeFigureOut">
               <a:rPr lang="en-US" smtClean="0"/>
-              <a:t>03/23/2022</a:t>
+              <a:t>08/27/2022</a:t>
             </a:fld>
             <a:endParaRPr lang="en-US"/>
           </a:p>
@@ -1447,7 +1447,7 @@
           <a:p>
             <a:fld id="{0C443C8C-1446-4BE2-8B22-EED4E0554042}" type="datetimeFigureOut">
               <a:rPr lang="en-US" smtClean="0"/>
-              <a:t>03/23/2022</a:t>
+              <a:t>08/27/2022</a:t>
             </a:fld>
             <a:endParaRPr lang="en-US"/>
           </a:p>
@@ -1655,7 +1655,7 @@
           <a:p>
             <a:fld id="{0C443C8C-1446-4BE2-8B22-EED4E0554042}" type="datetimeFigureOut">
               <a:rPr lang="en-US" smtClean="0"/>
-              <a:t>03/23/2022</a:t>
+              <a:t>08/27/2022</a:t>
             </a:fld>
             <a:endParaRPr lang="en-US"/>
           </a:p>
@@ -1853,7 +1853,7 @@
           <a:p>
             <a:fld id="{0C443C8C-1446-4BE2-8B22-EED4E0554042}" type="datetimeFigureOut">
               <a:rPr lang="en-US" smtClean="0"/>
-              <a:t>03/23/2022</a:t>
+              <a:t>08/27/2022</a:t>
             </a:fld>
             <a:endParaRPr lang="en-US"/>
           </a:p>
@@ -2128,7 +2128,7 @@
           <a:p>
             <a:fld id="{0C443C8C-1446-4BE2-8B22-EED4E0554042}" type="datetimeFigureOut">
               <a:rPr lang="en-US" smtClean="0"/>
-              <a:t>03/23/2022</a:t>
+              <a:t>08/27/2022</a:t>
             </a:fld>
             <a:endParaRPr lang="en-US"/>
           </a:p>
@@ -2393,7 +2393,7 @@
           <a:p>
             <a:fld id="{0C443C8C-1446-4BE2-8B22-EED4E0554042}" type="datetimeFigureOut">
               <a:rPr lang="en-US" smtClean="0"/>
-              <a:t>03/23/2022</a:t>
+              <a:t>08/27/2022</a:t>
             </a:fld>
             <a:endParaRPr lang="en-US"/>
           </a:p>
@@ -2805,7 +2805,7 @@
           <a:p>
             <a:fld id="{0C443C8C-1446-4BE2-8B22-EED4E0554042}" type="datetimeFigureOut">
               <a:rPr lang="en-US" smtClean="0"/>
-              <a:t>03/23/2022</a:t>
+              <a:t>08/27/2022</a:t>
             </a:fld>
             <a:endParaRPr lang="en-US"/>
           </a:p>
@@ -2946,7 +2946,7 @@
           <a:p>
             <a:fld id="{0C443C8C-1446-4BE2-8B22-EED4E0554042}" type="datetimeFigureOut">
               <a:rPr lang="en-US" smtClean="0"/>
-              <a:t>03/23/2022</a:t>
+              <a:t>08/27/2022</a:t>
             </a:fld>
             <a:endParaRPr lang="en-US"/>
           </a:p>
@@ -3059,7 +3059,7 @@
           <a:p>
             <a:fld id="{0C443C8C-1446-4BE2-8B22-EED4E0554042}" type="datetimeFigureOut">
               <a:rPr lang="en-US" smtClean="0"/>
-              <a:t>03/23/2022</a:t>
+              <a:t>08/27/2022</a:t>
             </a:fld>
             <a:endParaRPr lang="en-US"/>
           </a:p>
@@ -3370,7 +3370,7 @@
           <a:p>
             <a:fld id="{0C443C8C-1446-4BE2-8B22-EED4E0554042}" type="datetimeFigureOut">
               <a:rPr lang="en-US" smtClean="0"/>
-              <a:t>03/23/2022</a:t>
+              <a:t>08/27/2022</a:t>
             </a:fld>
             <a:endParaRPr lang="en-US"/>
           </a:p>
@@ -3658,7 +3658,7 @@
           <a:p>
             <a:fld id="{0C443C8C-1446-4BE2-8B22-EED4E0554042}" type="datetimeFigureOut">
               <a:rPr lang="en-US" smtClean="0"/>
-              <a:t>03/23/2022</a:t>
+              <a:t>08/27/2022</a:t>
             </a:fld>
             <a:endParaRPr lang="en-US"/>
           </a:p>
@@ -3899,7 +3899,7 @@
           <a:p>
             <a:fld id="{0C443C8C-1446-4BE2-8B22-EED4E0554042}" type="datetimeFigureOut">
               <a:rPr lang="en-US" smtClean="0"/>
-              <a:t>03/23/2022</a:t>
+              <a:t>08/27/2022</a:t>
             </a:fld>
             <a:endParaRPr lang="en-US"/>
           </a:p>
@@ -7698,7 +7698,7 @@
         </p:nvSpPr>
         <p:spPr>
           <a:xfrm>
-            <a:off x="838200" y="2616200"/>
+            <a:off x="838200" y="2855912"/>
             <a:ext cx="10515600" cy="1146175"/>
           </a:xfrm>
         </p:spPr>

</xml_diff>